<commit_message>
fixing slide titles on presentation 4
</commit_message>
<xml_diff>
--- a/presentations/powerpoints/4_data_types_and_variables.pptx
+++ b/presentations/powerpoints/4_data_types_and_variables.pptx
@@ -11929,17 +11929,8 @@
           <a:p>
             <a:pPr lvl="0"/>
             <a:r>
-              <a:rPr lang="en-US" dirty="0">
-                <a:latin typeface="Roboto"/>
-                <a:ea typeface="Roboto"/>
-                <a:cs typeface="Roboto"/>
-                <a:sym typeface="Roboto"/>
-              </a:rPr>
-              <a:t>Solve the following </a:t>
-            </a:r>
-            <a:r>
               <a:rPr lang="en-US" dirty="0"/>
-              <a:t>algebra problem:</a:t>
+              <a:t>Defining and Using Variables</a:t>
             </a:r>
             <a:endParaRPr dirty="0">
               <a:latin typeface="Roboto"/>
@@ -12530,12 +12521,20 @@
             <a:r>
               <a:rPr lang="en-US" dirty="0">
                 <a:solidFill>
+                  <a:srgbClr val="FF0000"/>
+                </a:solidFill>
+              </a:rPr>
+              <a:t>We need to be told what they mean</a:t>
+            </a:r>
+            <a:r>
+              <a:rPr lang="en-US" dirty="0">
+                <a:solidFill>
                   <a:schemeClr val="tx2">
                     <a:lumMod val="50000"/>
                   </a:schemeClr>
                 </a:solidFill>
               </a:rPr>
-              <a:t>We need to be told what they mean (they need to be defined) first.</a:t>
+              <a:t> (they need to be defined) BEFORE we can use them.</a:t>
             </a:r>
           </a:p>
           <a:p>
@@ -12711,17 +12710,8 @@
           <a:p>
             <a:pPr lvl="0"/>
             <a:r>
-              <a:rPr lang="en-US" dirty="0">
-                <a:latin typeface="Roboto"/>
-                <a:ea typeface="Roboto"/>
-                <a:cs typeface="Roboto"/>
-                <a:sym typeface="Roboto"/>
-              </a:rPr>
-              <a:t>Solve the following </a:t>
-            </a:r>
-            <a:r>
               <a:rPr lang="en-US" dirty="0"/>
-              <a:t>algebra problem:</a:t>
+              <a:t>Defining and Using Variables</a:t>
             </a:r>
             <a:endParaRPr dirty="0">
               <a:latin typeface="Roboto"/>

</xml_diff>